<commit_message>
màj ppwt + modif readme
</commit_message>
<xml_diff>
--- a/Tuto git pour les nuls.pptx
+++ b/Tuto git pour les nuls.pptx
@@ -3697,14 +3697,14 @@
           <p:nvPr>
             <p:extLst>
               <p:ext uri="{D42A27DB-BD31-4B8C-83A1-F6EECF244321}">
-                <p14:modId xmlns:p14="http://schemas.microsoft.com/office/powerpoint/2010/main" val="1719405228"/>
+                <p14:modId xmlns:p14="http://schemas.microsoft.com/office/powerpoint/2010/main" val="937106137"/>
               </p:ext>
             </p:extLst>
           </p:nvPr>
         </p:nvGraphicFramePr>
         <p:xfrm>
           <a:off x="838200" y="3718334"/>
-          <a:ext cx="10515600" cy="2494280"/>
+          <a:ext cx="10515600" cy="2392680"/>
         </p:xfrm>
         <a:graphic>
           <a:graphicData uri="http://schemas.openxmlformats.org/drawingml/2006/table">
@@ -3863,7 +3863,22 @@
                         <a:rPr lang="fr-CA" noProof="0" dirty="0" err="1"/>
                         <a:t>Ctrl+Shift+V</a:t>
                       </a:r>
-                      <a:endParaRPr lang="fr-CA" noProof="0" dirty="0"/>
+                      <a:r>
+                        <a:rPr lang="fr-CA" noProof="0" dirty="0"/>
+                        <a:t> </a:t>
+                      </a:r>
+                      <a:r>
+                        <a:rPr lang="fr-CA" noProof="0" dirty="0">
+                          <a:solidFill>
+                            <a:srgbClr val="FF0000"/>
+                          </a:solidFill>
+                        </a:rPr>
+                        <a:t>ou</a:t>
+                      </a:r>
+                      <a:r>
+                        <a:rPr lang="fr-CA" noProof="0" dirty="0"/>
+                        <a:t> clic sur la roulette (souris)</a:t>
+                      </a:r>
                     </a:p>
                   </a:txBody>
                   <a:tcPr/>
@@ -3961,38 +3976,6 @@
                 <a:extLst>
                   <a:ext uri="{0D108BD9-81ED-4DB2-BD59-A6C34878D82A}">
                     <a16:rowId xmlns:a16="http://schemas.microsoft.com/office/drawing/2014/main" val="1849656398"/>
-                  </a:ext>
-                </a:extLst>
-              </a:tr>
-              <a:tr h="370840">
-                <a:tc>
-                  <a:txBody>
-                    <a:bodyPr/>
-                    <a:lstStyle/>
-                    <a:p>
-                      <a:pPr algn="l"/>
-                      <a:r>
-                        <a:rPr lang="fr-CA" noProof="0" dirty="0" err="1"/>
-                        <a:t>Ctrl+C</a:t>
-                      </a:r>
-                      <a:endParaRPr lang="fr-CA" noProof="0" dirty="0"/>
-                    </a:p>
-                  </a:txBody>
-                  <a:tcPr/>
-                </a:tc>
-                <a:tc>
-                  <a:txBody>
-                    <a:bodyPr/>
-                    <a:lstStyle/>
-                    <a:p>
-                      <a:endParaRPr lang="fr-CA" noProof="0" dirty="0"/>
-                    </a:p>
-                  </a:txBody>
-                  <a:tcPr/>
-                </a:tc>
-                <a:extLst>
-                  <a:ext uri="{0D108BD9-81ED-4DB2-BD59-A6C34878D82A}">
-                    <a16:rowId xmlns:a16="http://schemas.microsoft.com/office/drawing/2014/main" val="4248418526"/>
                   </a:ext>
                 </a:extLst>
               </a:tr>

</xml_diff>